<commit_message>
fix reference to restaurent_class to reflect that it's now called restaurant_collection
</commit_message>
<xml_diff>
--- a/Python as an additional language/Lesson 8/Session 8.pptx
+++ b/Python as an additional language/Lesson 8/Session 8.pptx
@@ -210,7 +210,7 @@
           <a:p>
             <a:fld id="{80DBA8FE-2D35-DF41-A7EC-94CB8E651B1C}" type="datetimeFigureOut">
               <a:rPr lang="en-US" smtClean="0"/>
-              <a:t>11/9/16</a:t>
+              <a:t>7/20/17</a:t>
             </a:fld>
             <a:endParaRPr lang="en-US"/>
           </a:p>
@@ -1233,7 +1233,7 @@
           <a:p>
             <a:fld id="{341A5339-6120-134C-B7F3-8A3A216FC851}" type="datetimeFigureOut">
               <a:rPr lang="en-US" smtClean="0"/>
-              <a:t>11/9/16</a:t>
+              <a:t>7/20/17</a:t>
             </a:fld>
             <a:endParaRPr lang="en-US"/>
           </a:p>
@@ -1403,7 +1403,7 @@
           <a:p>
             <a:fld id="{341A5339-6120-134C-B7F3-8A3A216FC851}" type="datetimeFigureOut">
               <a:rPr lang="en-US" smtClean="0"/>
-              <a:t>11/9/16</a:t>
+              <a:t>7/20/17</a:t>
             </a:fld>
             <a:endParaRPr lang="en-US"/>
           </a:p>
@@ -1583,7 +1583,7 @@
           <a:p>
             <a:fld id="{341A5339-6120-134C-B7F3-8A3A216FC851}" type="datetimeFigureOut">
               <a:rPr lang="en-US" smtClean="0"/>
-              <a:t>11/9/16</a:t>
+              <a:t>7/20/17</a:t>
             </a:fld>
             <a:endParaRPr lang="en-US"/>
           </a:p>
@@ -1753,7 +1753,7 @@
           <a:p>
             <a:fld id="{341A5339-6120-134C-B7F3-8A3A216FC851}" type="datetimeFigureOut">
               <a:rPr lang="en-US" smtClean="0"/>
-              <a:t>11/9/16</a:t>
+              <a:t>7/20/17</a:t>
             </a:fld>
             <a:endParaRPr lang="en-US"/>
           </a:p>
@@ -1999,7 +1999,7 @@
           <a:p>
             <a:fld id="{341A5339-6120-134C-B7F3-8A3A216FC851}" type="datetimeFigureOut">
               <a:rPr lang="en-US" smtClean="0"/>
-              <a:t>11/9/16</a:t>
+              <a:t>7/20/17</a:t>
             </a:fld>
             <a:endParaRPr lang="en-US"/>
           </a:p>
@@ -2231,7 +2231,7 @@
           <a:p>
             <a:fld id="{341A5339-6120-134C-B7F3-8A3A216FC851}" type="datetimeFigureOut">
               <a:rPr lang="en-US" smtClean="0"/>
-              <a:t>11/9/16</a:t>
+              <a:t>7/20/17</a:t>
             </a:fld>
             <a:endParaRPr lang="en-US"/>
           </a:p>
@@ -2598,7 +2598,7 @@
           <a:p>
             <a:fld id="{341A5339-6120-134C-B7F3-8A3A216FC851}" type="datetimeFigureOut">
               <a:rPr lang="en-US" smtClean="0"/>
-              <a:t>11/9/16</a:t>
+              <a:t>7/20/17</a:t>
             </a:fld>
             <a:endParaRPr lang="en-US"/>
           </a:p>
@@ -2716,7 +2716,7 @@
           <a:p>
             <a:fld id="{341A5339-6120-134C-B7F3-8A3A216FC851}" type="datetimeFigureOut">
               <a:rPr lang="en-US" smtClean="0"/>
-              <a:t>11/9/16</a:t>
+              <a:t>7/20/17</a:t>
             </a:fld>
             <a:endParaRPr lang="en-US"/>
           </a:p>
@@ -2811,7 +2811,7 @@
           <a:p>
             <a:fld id="{341A5339-6120-134C-B7F3-8A3A216FC851}" type="datetimeFigureOut">
               <a:rPr lang="en-US" smtClean="0"/>
-              <a:t>11/9/16</a:t>
+              <a:t>7/20/17</a:t>
             </a:fld>
             <a:endParaRPr lang="en-US"/>
           </a:p>
@@ -3088,7 +3088,7 @@
           <a:p>
             <a:fld id="{341A5339-6120-134C-B7F3-8A3A216FC851}" type="datetimeFigureOut">
               <a:rPr lang="en-US" smtClean="0"/>
-              <a:t>11/9/16</a:t>
+              <a:t>7/20/17</a:t>
             </a:fld>
             <a:endParaRPr lang="en-US"/>
           </a:p>
@@ -3341,7 +3341,7 @@
           <a:p>
             <a:fld id="{341A5339-6120-134C-B7F3-8A3A216FC851}" type="datetimeFigureOut">
               <a:rPr lang="en-US" smtClean="0"/>
-              <a:t>11/9/16</a:t>
+              <a:t>7/20/17</a:t>
             </a:fld>
             <a:endParaRPr lang="en-US"/>
           </a:p>
@@ -3554,7 +3554,7 @@
           <a:p>
             <a:fld id="{341A5339-6120-134C-B7F3-8A3A216FC851}" type="datetimeFigureOut">
               <a:rPr lang="en-US" smtClean="0"/>
-              <a:t>11/9/16</a:t>
+              <a:t>7/20/17</a:t>
             </a:fld>
             <a:endParaRPr lang="en-US"/>
           </a:p>
@@ -5120,6 +5120,35 @@
       </p:sp>
       <p:pic>
         <p:nvPicPr>
+          <p:cNvPr id="6" name="Content Placeholder 5"/>
+          <p:cNvPicPr>
+            <a:picLocks noGrp="1" noChangeAspect="1"/>
+          </p:cNvPicPr>
+          <p:nvPr>
+            <p:ph idx="1"/>
+          </p:nvPr>
+        </p:nvPicPr>
+        <p:blipFill>
+          <a:blip r:embed="rId3">
+            <a:extLst>
+              <a:ext uri="{28A0092B-C50C-407E-A947-70E740481C1C}">
+                <a14:useLocalDpi xmlns:a14="http://schemas.microsoft.com/office/drawing/2010/main" val="0"/>
+              </a:ext>
+            </a:extLst>
+          </a:blip>
+          <a:stretch>
+            <a:fillRect/>
+          </a:stretch>
+        </p:blipFill>
+        <p:spPr>
+          <a:xfrm>
+            <a:off x="2134276" y="1690688"/>
+            <a:ext cx="7923447" cy="4351338"/>
+          </a:xfrm>
+        </p:spPr>
+      </p:pic>
+      <p:pic>
+        <p:nvPicPr>
           <p:cNvPr id="4" name="Picture 3"/>
           <p:cNvPicPr>
             <a:picLocks noChangeAspect="1"/>
@@ -5127,7 +5156,7 @@
           <p:nvPr/>
         </p:nvPicPr>
         <p:blipFill>
-          <a:blip r:embed="rId3">
+          <a:blip r:embed="rId4">
             <a:extLst>
               <a:ext uri="{28A0092B-C50C-407E-A947-70E740481C1C}">
                 <a14:useLocalDpi xmlns:a14="http://schemas.microsoft.com/office/drawing/2010/main" val="0"/>
@@ -5146,35 +5175,6 @@
           <a:prstGeom prst="rect">
             <a:avLst/>
           </a:prstGeom>
-        </p:spPr>
-      </p:pic>
-      <p:pic>
-        <p:nvPicPr>
-          <p:cNvPr id="5" name="Content Placeholder 4"/>
-          <p:cNvPicPr>
-            <a:picLocks noGrp="1" noChangeAspect="1"/>
-          </p:cNvPicPr>
-          <p:nvPr>
-            <p:ph idx="1"/>
-          </p:nvPr>
-        </p:nvPicPr>
-        <p:blipFill>
-          <a:blip r:embed="rId4">
-            <a:extLst>
-              <a:ext uri="{28A0092B-C50C-407E-A947-70E740481C1C}">
-                <a14:useLocalDpi xmlns:a14="http://schemas.microsoft.com/office/drawing/2010/main" val="0"/>
-              </a:ext>
-            </a:extLst>
-          </a:blip>
-          <a:stretch>
-            <a:fillRect/>
-          </a:stretch>
-        </p:blipFill>
-        <p:spPr>
-          <a:xfrm>
-            <a:off x="2506726" y="1384663"/>
-            <a:ext cx="7178548" cy="4792300"/>
-          </a:xfrm>
         </p:spPr>
       </p:pic>
     </p:spTree>
@@ -5327,7 +5327,6 @@
               <a:rPr lang="en-US" dirty="0" smtClean="0"/>
               <a:t> </a:t>
             </a:r>
-            <a:endParaRPr lang="en-US" dirty="0" smtClean="0"/>
           </a:p>
         </p:txBody>
       </p:sp>

</xml_diff>

<commit_message>
Clarified comments in example code
</commit_message>
<xml_diff>
--- a/Python as an additional language/Lesson 8/Session 8.pptx
+++ b/Python as an additional language/Lesson 8/Session 8.pptx
@@ -4326,8 +4326,13 @@
             <a:pPr lvl="1"/>
             <a:r>
               <a:rPr lang="en-US" dirty="0" smtClean="0"/>
-              <a:t>PUT (adds a new restaurant) </a:t>
-            </a:r>
+              <a:t>PUT (adds a new </a:t>
+            </a:r>
+            <a:r>
+              <a:rPr lang="en-US" dirty="0" smtClean="0"/>
+              <a:t>restaurant / updates an existing one) </a:t>
+            </a:r>
+            <a:endParaRPr lang="en-US" dirty="0" smtClean="0"/>
           </a:p>
           <a:p>
             <a:pPr lvl="1"/>
@@ -4510,7 +4515,7 @@
       </p:sp>
       <p:pic>
         <p:nvPicPr>
-          <p:cNvPr id="7" name="Content Placeholder 6"/>
+          <p:cNvPr id="4" name="Content Placeholder 3"/>
           <p:cNvPicPr>
             <a:picLocks noGrp="1" noChangeAspect="1"/>
           </p:cNvPicPr>
@@ -4532,8 +4537,8 @@
         </p:blipFill>
         <p:spPr>
           <a:xfrm>
-            <a:off x="1355926" y="1825625"/>
-            <a:ext cx="9480148" cy="4351338"/>
+            <a:off x="1178131" y="1825625"/>
+            <a:ext cx="9835737" cy="4351338"/>
           </a:xfrm>
         </p:spPr>
       </p:pic>

</xml_diff>